<commit_message>
Update to Mod 1 slides
</commit_message>
<xml_diff>
--- a/Slides/Module 1 - Flask Application Design.pptx
+++ b/Slides/Module 1 - Flask Application Design.pptx
@@ -231,7 +231,7 @@
           <a:p>
             <a:fld id="{312E7B4A-039C-48A2-9B2C-AF16AA3873D8}" type="datetimeFigureOut">
               <a:rPr lang="en-US" smtClean="0"/>
-              <a:t>2/27/2015</a:t>
+              <a:t>3/3/2015</a:t>
             </a:fld>
             <a:endParaRPr lang="en-US"/>
           </a:p>
@@ -396,7 +396,7 @@
           <a:p>
             <a:fld id="{DA005A0C-54D9-45AA-87D4-C551D08DFCE1}" type="datetimeFigureOut">
               <a:rPr lang="en-US" smtClean="0"/>
-              <a:t>2/27/2015</a:t>
+              <a:t>3/3/2015</a:t>
             </a:fld>
             <a:endParaRPr lang="en-US"/>
           </a:p>
@@ -12100,14 +12100,14 @@
                 <a:gridCol w="5762625">
                   <a:extLst>
                     <a:ext uri="{9D8B030D-6E8A-4147-A177-3AD203B41FA5}">
-                      <a16:colId xmlns:a16="http://schemas.microsoft.com/office/drawing/2014/main" xmlns="" val="1632794655"/>
+                      <a16:colId xmlns="" xmlns:a16="http://schemas.microsoft.com/office/drawing/2014/main" val="1632794655"/>
                     </a:ext>
                   </a:extLst>
                 </a:gridCol>
                 <a:gridCol w="5762625">
                   <a:extLst>
                     <a:ext uri="{9D8B030D-6E8A-4147-A177-3AD203B41FA5}">
-                      <a16:colId xmlns:a16="http://schemas.microsoft.com/office/drawing/2014/main" xmlns="" val="2011313899"/>
+                      <a16:colId xmlns="" xmlns:a16="http://schemas.microsoft.com/office/drawing/2014/main" val="2011313899"/>
                     </a:ext>
                   </a:extLst>
                 </a:gridCol>
@@ -12145,7 +12145,7 @@
                 </a:tc>
                 <a:extLst>
                   <a:ext uri="{0D108BD9-81ED-4DB2-BD59-A6C34878D82A}">
-                    <a16:rowId xmlns:a16="http://schemas.microsoft.com/office/drawing/2014/main" xmlns="" val="1789177411"/>
+                    <a16:rowId xmlns="" xmlns:a16="http://schemas.microsoft.com/office/drawing/2014/main" val="1789177411"/>
                   </a:ext>
                 </a:extLst>
               </a:tr>
@@ -12192,7 +12192,7 @@
                 </a:tc>
                 <a:extLst>
                   <a:ext uri="{0D108BD9-81ED-4DB2-BD59-A6C34878D82A}">
-                    <a16:rowId xmlns:a16="http://schemas.microsoft.com/office/drawing/2014/main" xmlns="" val="3842815335"/>
+                    <a16:rowId xmlns="" xmlns:a16="http://schemas.microsoft.com/office/drawing/2014/main" val="3842815335"/>
                   </a:ext>
                 </a:extLst>
               </a:tr>
@@ -12260,7 +12260,7 @@
                 </a:tc>
                 <a:extLst>
                   <a:ext uri="{0D108BD9-81ED-4DB2-BD59-A6C34878D82A}">
-                    <a16:rowId xmlns:a16="http://schemas.microsoft.com/office/drawing/2014/main" xmlns="" val="321066646"/>
+                    <a16:rowId xmlns="" xmlns:a16="http://schemas.microsoft.com/office/drawing/2014/main" val="321066646"/>
                   </a:ext>
                 </a:extLst>
               </a:tr>
@@ -12331,7 +12331,7 @@
                 </a:tc>
                 <a:extLst>
                   <a:ext uri="{0D108BD9-81ED-4DB2-BD59-A6C34878D82A}">
-                    <a16:rowId xmlns:a16="http://schemas.microsoft.com/office/drawing/2014/main" xmlns="" val="3812060533"/>
+                    <a16:rowId xmlns="" xmlns:a16="http://schemas.microsoft.com/office/drawing/2014/main" val="3812060533"/>
                   </a:ext>
                 </a:extLst>
               </a:tr>
@@ -12588,20 +12588,12 @@
               <a:t>Enter this code: </a:t>
             </a:r>
             <a:r>
-              <a:rPr lang="en-US" b="1" dirty="0" smtClean="0">
-                <a:solidFill>
-                  <a:srgbClr val="FF0000"/>
-                </a:solidFill>
-              </a:rPr>
-              <a:t>PowerJump1 </a:t>
-            </a:r>
-            <a:r>
-              <a:rPr lang="en-US" dirty="0" smtClean="0">
-                <a:solidFill>
-                  <a:srgbClr val="FF0000"/>
-                </a:solidFill>
-              </a:rPr>
-              <a:t>(expires 8/15/2013)</a:t>
+              <a:rPr lang="en-US" b="1" dirty="0" err="1" smtClean="0"/>
+              <a:t>SQLPythonFlask</a:t>
+            </a:r>
+            <a:r>
+              <a:rPr lang="en-US" dirty="0" smtClean="0"/>
+              <a:t> (expires 6Apr15)</a:t>
             </a:r>
             <a:endParaRPr lang="en-US" dirty="0">
               <a:solidFill>
@@ -15054,6 +15046,21 @@
 </file>
 
 <file path=customXml/item1.xml><?xml version="1.0" encoding="utf-8"?>
+<?mso-contentType ?>
+<FormTemplates xmlns="http://schemas.microsoft.com/sharepoint/v3/contenttype/forms">
+  <Display>DocumentLibraryForm</Display>
+  <Edit>DocumentLibraryForm</Edit>
+  <New>DocumentLibraryForm</New>
+</FormTemplates>
+</file>
+
+<file path=customXml/item2.xml><?xml version="1.0" encoding="utf-8"?>
+<p:properties xmlns:p="http://schemas.microsoft.com/office/2006/metadata/properties" xmlns:xsi="http://www.w3.org/2001/XMLSchema-instance" xmlns:pc="http://schemas.microsoft.com/office/infopath/2007/PartnerControls">
+  <documentManagement/>
+</p:properties>
+</file>
+
+<file path=customXml/item3.xml><?xml version="1.0" encoding="utf-8"?>
 <ct:contentTypeSchema xmlns:ct="http://schemas.microsoft.com/office/2006/metadata/contentType" xmlns:ma="http://schemas.microsoft.com/office/2006/metadata/properties/metaAttributes" ct:_="" ma:_="" ma:contentTypeName="Document" ma:contentTypeID="0x010100BD9BF63586D9884E9335F37127EABBE8" ma:contentTypeVersion="1" ma:contentTypeDescription="Create a new document." ma:contentTypeScope="" ma:versionID="b9abee3a6b7d355b9c1a31dbb76ab4bc">
   <xsd:schema xmlns:xsd="http://www.w3.org/2001/XMLSchema" xmlns:xs="http://www.w3.org/2001/XMLSchema" xmlns:p="http://schemas.microsoft.com/office/2006/metadata/properties" xmlns:ns3="e5a13ba8-98e3-4f23-a221-7ac9824aa662" targetNamespace="http://schemas.microsoft.com/office/2006/metadata/properties" ma:root="true" ma:fieldsID="9d02d2e6bc0f5948a1713c06f6c13b3b" ns3:_="">
     <xsd:import namespace="e5a13ba8-98e3-4f23-a221-7ac9824aa662"/>
@@ -15193,35 +15200,10 @@
 </ct:contentTypeSchema>
 </file>
 
-<file path=customXml/item2.xml><?xml version="1.0" encoding="utf-8"?>
-<p:properties xmlns:p="http://schemas.microsoft.com/office/2006/metadata/properties" xmlns:xsi="http://www.w3.org/2001/XMLSchema-instance" xmlns:pc="http://schemas.microsoft.com/office/infopath/2007/PartnerControls">
-  <documentManagement/>
-</p:properties>
-</file>
-
-<file path=customXml/item3.xml><?xml version="1.0" encoding="utf-8"?>
-<?mso-contentType ?>
-<FormTemplates xmlns="http://schemas.microsoft.com/sharepoint/v3/contenttype/forms">
-  <Display>DocumentLibraryForm</Display>
-  <Edit>DocumentLibraryForm</Edit>
-  <New>DocumentLibraryForm</New>
-</FormTemplates>
-</file>
-
 <file path=customXml/itemProps1.xml><?xml version="1.0" encoding="utf-8"?>
-<ds:datastoreItem xmlns:ds="http://schemas.openxmlformats.org/officeDocument/2006/customXml" ds:itemID="{1E1E45CC-2FEE-40FA-AA55-B597D74C6344}">
+<ds:datastoreItem xmlns:ds="http://schemas.openxmlformats.org/officeDocument/2006/customXml" ds:itemID="{B0CA13EC-1D3C-4D6F-8D1C-E8A452CFC79A}">
   <ds:schemaRefs>
-    <ds:schemaRef ds:uri="http://schemas.microsoft.com/office/2006/metadata/contentType"/>
-    <ds:schemaRef ds:uri="http://schemas.microsoft.com/office/2006/metadata/properties/metaAttributes"/>
-    <ds:schemaRef ds:uri="http://www.w3.org/2001/XMLSchema"/>
-    <ds:schemaRef ds:uri="http://schemas.microsoft.com/office/2006/metadata/properties"/>
-    <ds:schemaRef ds:uri="e5a13ba8-98e3-4f23-a221-7ac9824aa662"/>
-    <ds:schemaRef ds:uri="http://schemas.microsoft.com/office/2006/documentManagement/types"/>
-    <ds:schemaRef ds:uri="http://schemas.microsoft.com/office/infopath/2007/PartnerControls"/>
-    <ds:schemaRef ds:uri="http://schemas.openxmlformats.org/package/2006/metadata/core-properties"/>
-    <ds:schemaRef ds:uri="http://purl.org/dc/elements/1.1/"/>
-    <ds:schemaRef ds:uri="http://purl.org/dc/terms/"/>
-    <ds:schemaRef ds:uri="http://schemas.microsoft.com/internal/obd"/>
+    <ds:schemaRef ds:uri="http://schemas.microsoft.com/sharepoint/v3/contenttype/forms"/>
   </ds:schemaRefs>
 </ds:datastoreItem>
 </file>
@@ -15243,9 +15225,19 @@
 </file>
 
 <file path=customXml/itemProps3.xml><?xml version="1.0" encoding="utf-8"?>
-<ds:datastoreItem xmlns:ds="http://schemas.openxmlformats.org/officeDocument/2006/customXml" ds:itemID="{B0CA13EC-1D3C-4D6F-8D1C-E8A452CFC79A}">
+<ds:datastoreItem xmlns:ds="http://schemas.openxmlformats.org/officeDocument/2006/customXml" ds:itemID="{1E1E45CC-2FEE-40FA-AA55-B597D74C6344}">
   <ds:schemaRefs>
-    <ds:schemaRef ds:uri="http://schemas.microsoft.com/sharepoint/v3/contenttype/forms"/>
+    <ds:schemaRef ds:uri="http://schemas.microsoft.com/office/2006/metadata/contentType"/>
+    <ds:schemaRef ds:uri="http://schemas.microsoft.com/office/2006/metadata/properties/metaAttributes"/>
+    <ds:schemaRef ds:uri="http://www.w3.org/2001/XMLSchema"/>
+    <ds:schemaRef ds:uri="http://schemas.microsoft.com/office/2006/metadata/properties"/>
+    <ds:schemaRef ds:uri="e5a13ba8-98e3-4f23-a221-7ac9824aa662"/>
+    <ds:schemaRef ds:uri="http://schemas.microsoft.com/office/2006/documentManagement/types"/>
+    <ds:schemaRef ds:uri="http://schemas.microsoft.com/office/infopath/2007/PartnerControls"/>
+    <ds:schemaRef ds:uri="http://schemas.openxmlformats.org/package/2006/metadata/core-properties"/>
+    <ds:schemaRef ds:uri="http://purl.org/dc/elements/1.1/"/>
+    <ds:schemaRef ds:uri="http://purl.org/dc/terms/"/>
+    <ds:schemaRef ds:uri="http://schemas.microsoft.com/internal/obd"/>
   </ds:schemaRefs>
 </ds:datastoreItem>
 </file>
</xml_diff>